<commit_message>
Updated with running changes
</commit_message>
<xml_diff>
--- a/Python_CrashCourse_SRD.pptx
+++ b/Python_CrashCourse_SRD.pptx
@@ -250,7 +250,7 @@
           <a:p>
             <a:fld id="{13F6AEEE-E778-402E-8B8F-9A98AED26EB8}" type="datetimeFigureOut">
               <a:rPr lang="en-GB" smtClean="0"/>
-              <a:t>27/10/2020</a:t>
+              <a:t>28/10/2020</a:t>
             </a:fld>
             <a:endParaRPr lang="en-GB"/>
           </a:p>
@@ -409,7 +409,7 @@
           <a:p>
             <a:fld id="{1386E511-D742-4EFE-90B5-C9FC42762E0F}" type="datetimeFigureOut">
               <a:rPr lang="en-GB" smtClean="0"/>
-              <a:t>27/10/2020</a:t>
+              <a:t>28/10/2020</a:t>
             </a:fld>
             <a:endParaRPr lang="en-GB"/>
           </a:p>
@@ -12016,7 +12016,13 @@
           <a:bodyPr/>
           <a:lstStyle/>
           <a:p>
-            <a:endParaRPr lang="en-US"/>
+            <a:r>
+              <a:rPr lang="da-DK"/>
+              <a:t>8.30-11.30 + 12.00-15.00</a:t>
+            </a:r>
+          </a:p>
+          <a:p>
+            <a:endParaRPr lang="en-US" dirty="0"/>
           </a:p>
         </p:txBody>
       </p:sp>
@@ -12767,6 +12773,44 @@
                 </a:hlinkClick>
               </a:rPr>
               <a:t>https://github.com/roesgaard/learn_python</a:t>
+            </a:r>
+            <a:r>
+              <a:rPr lang="da-DK" dirty="0">
+                <a:solidFill>
+                  <a:schemeClr val="tx2">
+                    <a:lumMod val="75000"/>
+                    <a:lumOff val="25000"/>
+                  </a:schemeClr>
+                </a:solidFill>
+              </a:rPr>
+              <a:t> </a:t>
+            </a:r>
+          </a:p>
+          <a:p>
+            <a:r>
+              <a:rPr lang="en-US" dirty="0"/>
+              <a:t>Solutions here:</a:t>
+            </a:r>
+          </a:p>
+          <a:p>
+            <a:pPr lvl="1"/>
+            <a:r>
+              <a:rPr lang="da-DK" dirty="0">
+                <a:solidFill>
+                  <a:schemeClr val="tx2">
+                    <a:lumMod val="75000"/>
+                    <a:lumOff val="25000"/>
+                  </a:schemeClr>
+                </a:solidFill>
+                <a:hlinkClick r:id="rId9">
+                  <a:extLst>
+                    <a:ext uri="{A12FA001-AC4F-418D-AE19-62706E023703}">
+                      <ahyp:hlinkClr xmlns:ahyp="http://schemas.microsoft.com/office/drawing/2018/hyperlinkcolor" val="tx"/>
+                    </a:ext>
+                  </a:extLst>
+                </a:hlinkClick>
+              </a:rPr>
+              <a:t>https://github.com/roesgaard/learn_python/tree/solutions</a:t>
             </a:r>
             <a:r>
               <a:rPr lang="da-DK" dirty="0">
@@ -15987,35 +16031,35 @@
 </file>
 
 <file path=customXml/item1.xml><?xml version="1.0" encoding="utf-8"?>
-<TemplafySlideTemplateConfiguration><![CDATA[{"elementsMetadata":[],"enableDocumentContentUpdater":true,"documentContentValidatorConfiguration":{"enableDocumentContentValidator":false,"documentContentValidatorVersion":0},"slideId":"636845265180758378","version":"1.0"}]]></TemplafySlideTemplateConfiguration>
+<TemplafyTemplateConfiguration><![CDATA[{"elementsMetadata":[],"transformationConfigurations":[],"templateName":"Presentation template","templateDescription":"","enableDocumentContentUpdater":true,"version":"1.0"}]]></TemplafyTemplateConfiguration>
 </file>
 
 <file path=customXml/item10.xml><?xml version="1.0" encoding="utf-8"?>
+<TemplafySlideTemplateConfiguration><![CDATA[{"elementsMetadata":[],"enableDocumentContentUpdater":true,"documentContentValidatorConfiguration":{"enableDocumentContentValidator":false,"documentContentValidatorVersion":0},"slideId":"636845265180758379","version":"1.0"}]]></TemplafySlideTemplateConfiguration>
+</file>
+
+<file path=customXml/item11.xml><?xml version="1.0" encoding="utf-8"?>
 <TemplafySlideFormConfiguration><![CDATA[{"formFields":[],"formDataEntries":[]}]]></TemplafySlideFormConfiguration>
 </file>
 
-<file path=customXml/item11.xml><?xml version="1.0" encoding="utf-8"?>
+<file path=customXml/item12.xml><?xml version="1.0" encoding="utf-8"?>
 <TemplafySlideTemplateConfiguration><![CDATA[{"elementsMetadata":[],"enableDocumentContentUpdater":true,"documentContentValidatorConfiguration":{"enableDocumentContentValidator":false,"documentContentValidatorVersion":0},"slideId":"636845265180758379","version":"1.0"}]]></TemplafySlideTemplateConfiguration>
 </file>
 
-<file path=customXml/item12.xml><?xml version="1.0" encoding="utf-8"?>
-<TemplafyFormConfiguration><![CDATA[{"formFields":[{"dataSource":"Classification","displayColumn":"classificationlabel","hideIfNoUserInteractionRequired":false,"distinct":true,"required":true,"autoSelectFirstOption":false,"defaultValue":"3","type":"dropDown","name":"Classification","label":"Classification","helpTexts":{"prefix":"","postfix":"To learn more about document classification please see the compliance section of the intranet"},"spacing":{},"fullyQualifiedName":"Classification"}],"formDataEntries":[]}]]></TemplafyFormConfiguration>
+<file path=customXml/item13.xml><?xml version="1.0" encoding="utf-8"?>
+<TemplafySlideFormConfiguration><![CDATA[{"formFields":[],"formDataEntries":[]}]]></TemplafySlideFormConfiguration>
 </file>
 
-<file path=customXml/item13.xml><?xml version="1.0" encoding="utf-8"?>
+<file path=customXml/item14.xml><?xml version="1.0" encoding="utf-8"?>
 <TemplafySlideTemplateConfiguration><![CDATA[{"elementsMetadata":[],"enableDocumentContentUpdater":true,"documentContentValidatorConfiguration":{"enableDocumentContentValidator":false,"documentContentValidatorVersion":0},"slideId":"636845265180758379","version":"1.0"}]]></TemplafySlideTemplateConfiguration>
 </file>
 
-<file path=customXml/item14.xml><?xml version="1.0" encoding="utf-8"?>
+<file path=customXml/item15.xml><?xml version="1.0" encoding="utf-8"?>
 <TemplafySlideFormConfiguration><![CDATA[{"formFields":[],"formDataEntries":[]}]]></TemplafySlideFormConfiguration>
 </file>
 
-<file path=customXml/item15.xml><?xml version="1.0" encoding="utf-8"?>
-<TemplafySlideTemplateConfiguration><![CDATA[{"elementsMetadata":[],"enableDocumentContentUpdater":true,"documentContentValidatorConfiguration":{"enableDocumentContentValidator":false,"documentContentValidatorVersion":0},"slideId":"636845265180758379","version":"1.0"}]]></TemplafySlideTemplateConfiguration>
-</file>
-
 <file path=customXml/item16.xml><?xml version="1.0" encoding="utf-8"?>
-<TemplafySlideTemplateConfiguration><![CDATA[{"elementsMetadata":[],"enableDocumentContentUpdater":true,"documentContentValidatorConfiguration":{"enableDocumentContentValidator":false,"documentContentValidatorVersion":0},"slideId":"636845265181227096","version":"1.0"}]]></TemplafySlideTemplateConfiguration>
+<TemplafySlideFormConfiguration><![CDATA[{"formFields":[],"formDataEntries":[]}]]></TemplafySlideFormConfiguration>
 </file>
 
 <file path=customXml/item17.xml><?xml version="1.0" encoding="utf-8"?>
@@ -16023,11 +16067,11 @@
 </file>
 
 <file path=customXml/item18.xml><?xml version="1.0" encoding="utf-8"?>
-<TemplafySlideFormConfiguration><![CDATA[{"formFields":[],"formDataEntries":[]}]]></TemplafySlideFormConfiguration>
+<TemplafySlideTemplateConfiguration><![CDATA[{"elementsMetadata":[],"enableDocumentContentUpdater":true,"documentContentValidatorConfiguration":{"enableDocumentContentValidator":false,"documentContentValidatorVersion":0},"slideId":"636845265180758379","version":"1.0"}]]></TemplafySlideTemplateConfiguration>
 </file>
 
 <file path=customXml/item19.xml><?xml version="1.0" encoding="utf-8"?>
-<TemplafySlideTemplateConfiguration><![CDATA[{"elementsMetadata":[],"enableDocumentContentUpdater":true,"documentContentValidatorConfiguration":{"enableDocumentContentValidator":false,"documentContentValidatorVersion":0},"slideId":"636845265180758379","version":"1.0"}]]></TemplafySlideTemplateConfiguration>
+<TemplafyFormConfiguration><![CDATA[{"formFields":[{"dataSource":"Classification","displayColumn":"classificationlabel","hideIfNoUserInteractionRequired":false,"distinct":true,"required":true,"autoSelectFirstOption":false,"defaultValue":"3","type":"dropDown","name":"Classification","label":"Classification","helpTexts":{"prefix":"","postfix":"To learn more about document classification please see the compliance section of the intranet"},"spacing":{},"fullyQualifiedName":"Classification"}],"formDataEntries":[]}]]></TemplafyFormConfiguration>
 </file>
 
 <file path=customXml/item2.xml><?xml version="1.0" encoding="utf-8"?>
@@ -16039,7 +16083,7 @@
 </file>
 
 <file path=customXml/item21.xml><?xml version="1.0" encoding="utf-8"?>
-<TemplafyTemplateConfiguration><![CDATA[{"elementsMetadata":[],"transformationConfigurations":[],"templateName":"Presentation template","templateDescription":"","enableDocumentContentUpdater":true,"version":"1.0"}]]></TemplafyTemplateConfiguration>
+<TemplafySlideTemplateConfiguration><![CDATA[{"elementsMetadata":[],"enableDocumentContentUpdater":true,"documentContentValidatorConfiguration":{"enableDocumentContentValidator":false,"documentContentValidatorVersion":0},"slideId":"636845265180758379","version":"1.0"}]]></TemplafySlideTemplateConfiguration>
 </file>
 
 <file path=customXml/item22.xml><?xml version="1.0" encoding="utf-8"?>
@@ -16047,27 +16091,27 @@
 </file>
 
 <file path=customXml/item3.xml><?xml version="1.0" encoding="utf-8"?>
+<TemplafySlideFormConfiguration><![CDATA[{"formFields":[],"formDataEntries":[]}]]></TemplafySlideFormConfiguration>
+</file>
+
+<file path=customXml/item4.xml><?xml version="1.0" encoding="utf-8"?>
+<TemplafySlideTemplateConfiguration><![CDATA[{"elementsMetadata":[],"enableDocumentContentUpdater":true,"documentContentValidatorConfiguration":{"enableDocumentContentValidator":false,"documentContentValidatorVersion":0},"slideId":"636845265181227096","version":"1.0"}]]></TemplafySlideTemplateConfiguration>
+</file>
+
+<file path=customXml/item5.xml><?xml version="1.0" encoding="utf-8"?>
+<TemplafySlideFormConfiguration><![CDATA[{"formFields":[],"formDataEntries":[]}]]></TemplafySlideFormConfiguration>
+</file>
+
+<file path=customXml/item6.xml><?xml version="1.0" encoding="utf-8"?>
+<TemplafySlideTemplateConfiguration><![CDATA[{"elementsMetadata":[],"enableDocumentContentUpdater":true,"documentContentValidatorConfiguration":{"enableDocumentContentValidator":false,"documentContentValidatorVersion":0},"slideId":"636845265180758378","version":"1.0"}]]></TemplafySlideTemplateConfiguration>
+</file>
+
+<file path=customXml/item7.xml><?xml version="1.0" encoding="utf-8"?>
 <TemplafySlideTemplateConfiguration><![CDATA[{"elementsMetadata":[],"enableDocumentContentUpdater":true,"documentContentValidatorConfiguration":{"enableDocumentContentValidator":false,"documentContentValidatorVersion":0},"slideId":"636845265180758379","version":"1.0"}]]></TemplafySlideTemplateConfiguration>
 </file>
 
-<file path=customXml/item4.xml><?xml version="1.0" encoding="utf-8"?>
-<TemplafySlideFormConfiguration><![CDATA[{"formFields":[],"formDataEntries":[]}]]></TemplafySlideFormConfiguration>
-</file>
-
-<file path=customXml/item5.xml><?xml version="1.0" encoding="utf-8"?>
+<file path=customXml/item8.xml><?xml version="1.0" encoding="utf-8"?>
 <TemplafySlideTemplateConfiguration><![CDATA[{"elementsMetadata":[],"enableDocumentContentUpdater":true,"documentContentValidatorConfiguration":{"enableDocumentContentValidator":false,"documentContentValidatorVersion":0},"slideId":"636845265180758379","version":"1.0"}]]></TemplafySlideTemplateConfiguration>
-</file>
-
-<file path=customXml/item6.xml><?xml version="1.0" encoding="utf-8"?>
-<TemplafySlideTemplateConfiguration><![CDATA[{"elementsMetadata":[],"enableDocumentContentUpdater":true,"documentContentValidatorConfiguration":{"enableDocumentContentValidator":false,"documentContentValidatorVersion":0},"slideId":"636845265180758379","version":"1.0"}]]></TemplafySlideTemplateConfiguration>
-</file>
-
-<file path=customXml/item7.xml><?xml version="1.0" encoding="utf-8"?>
-<TemplafySlideFormConfiguration><![CDATA[{"formFields":[],"formDataEntries":[]}]]></TemplafySlideFormConfiguration>
-</file>
-
-<file path=customXml/item8.xml><?xml version="1.0" encoding="utf-8"?>
-<TemplafySlideFormConfiguration><![CDATA[{"formFields":[],"formDataEntries":[]}]]></TemplafySlideFormConfiguration>
 </file>
 
 <file path=customXml/item9.xml><?xml version="1.0" encoding="utf-8"?>
@@ -16075,133 +16119,133 @@
 </file>
 
 <file path=customXml/itemProps1.xml><?xml version="1.0" encoding="utf-8"?>
+<ds:datastoreItem xmlns:ds="http://schemas.openxmlformats.org/officeDocument/2006/customXml" ds:itemID="{BE9F0B37-8E5E-44B3-A5A2-295809C64FD8}">
+  <ds:schemaRefs/>
+</ds:datastoreItem>
+</file>
+
+<file path=customXml/itemProps10.xml><?xml version="1.0" encoding="utf-8"?>
+<ds:datastoreItem xmlns:ds="http://schemas.openxmlformats.org/officeDocument/2006/customXml" ds:itemID="{4603A845-7477-4A6E-9426-1ECB74B20FBA}">
+  <ds:schemaRefs/>
+</ds:datastoreItem>
+</file>
+
+<file path=customXml/itemProps11.xml><?xml version="1.0" encoding="utf-8"?>
+<ds:datastoreItem xmlns:ds="http://schemas.openxmlformats.org/officeDocument/2006/customXml" ds:itemID="{B3EF2FD2-BCF0-47E9-B86F-B6B37A72A05C}">
+  <ds:schemaRefs/>
+</ds:datastoreItem>
+</file>
+
+<file path=customXml/itemProps12.xml><?xml version="1.0" encoding="utf-8"?>
+<ds:datastoreItem xmlns:ds="http://schemas.openxmlformats.org/officeDocument/2006/customXml" ds:itemID="{37BB0D0B-996E-4EBD-95D2-A7CE96883882}">
+  <ds:schemaRefs/>
+</ds:datastoreItem>
+</file>
+
+<file path=customXml/itemProps13.xml><?xml version="1.0" encoding="utf-8"?>
+<ds:datastoreItem xmlns:ds="http://schemas.openxmlformats.org/officeDocument/2006/customXml" ds:itemID="{81BA2BB5-CE29-4933-8B31-07379275F8E4}">
+  <ds:schemaRefs/>
+</ds:datastoreItem>
+</file>
+
+<file path=customXml/itemProps14.xml><?xml version="1.0" encoding="utf-8"?>
+<ds:datastoreItem xmlns:ds="http://schemas.openxmlformats.org/officeDocument/2006/customXml" ds:itemID="{1907735A-BAEB-4414-9DA2-54CF6BF835E6}">
+  <ds:schemaRefs/>
+</ds:datastoreItem>
+</file>
+
+<file path=customXml/itemProps15.xml><?xml version="1.0" encoding="utf-8"?>
+<ds:datastoreItem xmlns:ds="http://schemas.openxmlformats.org/officeDocument/2006/customXml" ds:itemID="{46E7D475-C485-48BC-BEE6-B943FFA37F8F}">
+  <ds:schemaRefs/>
+</ds:datastoreItem>
+</file>
+
+<file path=customXml/itemProps16.xml><?xml version="1.0" encoding="utf-8"?>
+<ds:datastoreItem xmlns:ds="http://schemas.openxmlformats.org/officeDocument/2006/customXml" ds:itemID="{066DBD01-7766-4ADE-86FC-51A662DEA336}">
+  <ds:schemaRefs/>
+</ds:datastoreItem>
+</file>
+
+<file path=customXml/itemProps17.xml><?xml version="1.0" encoding="utf-8"?>
+<ds:datastoreItem xmlns:ds="http://schemas.openxmlformats.org/officeDocument/2006/customXml" ds:itemID="{51676FE2-052D-44CF-A863-D00EA72E5A88}">
+  <ds:schemaRefs/>
+</ds:datastoreItem>
+</file>
+
+<file path=customXml/itemProps18.xml><?xml version="1.0" encoding="utf-8"?>
+<ds:datastoreItem xmlns:ds="http://schemas.openxmlformats.org/officeDocument/2006/customXml" ds:itemID="{4E80FE49-B6D5-444C-8179-6BDF83DE13CB}">
+  <ds:schemaRefs/>
+</ds:datastoreItem>
+</file>
+
+<file path=customXml/itemProps19.xml><?xml version="1.0" encoding="utf-8"?>
+<ds:datastoreItem xmlns:ds="http://schemas.openxmlformats.org/officeDocument/2006/customXml" ds:itemID="{97EC287E-AA16-4BA5-8D02-531B775D2B37}">
+  <ds:schemaRefs/>
+</ds:datastoreItem>
+</file>
+
+<file path=customXml/itemProps2.xml><?xml version="1.0" encoding="utf-8"?>
+<ds:datastoreItem xmlns:ds="http://schemas.openxmlformats.org/officeDocument/2006/customXml" ds:itemID="{98EF18BE-1F2F-4C4F-B16C-B44A85FF5E64}">
+  <ds:schemaRefs/>
+</ds:datastoreItem>
+</file>
+
+<file path=customXml/itemProps20.xml><?xml version="1.0" encoding="utf-8"?>
+<ds:datastoreItem xmlns:ds="http://schemas.openxmlformats.org/officeDocument/2006/customXml" ds:itemID="{BBEA1FFD-96EB-448C-872D-FD6D20257C06}">
+  <ds:schemaRefs/>
+</ds:datastoreItem>
+</file>
+
+<file path=customXml/itemProps21.xml><?xml version="1.0" encoding="utf-8"?>
+<ds:datastoreItem xmlns:ds="http://schemas.openxmlformats.org/officeDocument/2006/customXml" ds:itemID="{5F0E55E1-E112-49DF-82A6-308427439A24}">
+  <ds:schemaRefs/>
+</ds:datastoreItem>
+</file>
+
+<file path=customXml/itemProps22.xml><?xml version="1.0" encoding="utf-8"?>
+<ds:datastoreItem xmlns:ds="http://schemas.openxmlformats.org/officeDocument/2006/customXml" ds:itemID="{D1890F7F-DBEB-4506-B35E-064EE9ADD8AB}">
+  <ds:schemaRefs/>
+</ds:datastoreItem>
+</file>
+
+<file path=customXml/itemProps3.xml><?xml version="1.0" encoding="utf-8"?>
+<ds:datastoreItem xmlns:ds="http://schemas.openxmlformats.org/officeDocument/2006/customXml" ds:itemID="{E15104B5-7E90-4369-A767-1A4487C44DA8}">
+  <ds:schemaRefs/>
+</ds:datastoreItem>
+</file>
+
+<file path=customXml/itemProps4.xml><?xml version="1.0" encoding="utf-8"?>
+<ds:datastoreItem xmlns:ds="http://schemas.openxmlformats.org/officeDocument/2006/customXml" ds:itemID="{420D13E1-600A-4552-9E88-5C5946DC9924}">
+  <ds:schemaRefs/>
+</ds:datastoreItem>
+</file>
+
+<file path=customXml/itemProps5.xml><?xml version="1.0" encoding="utf-8"?>
+<ds:datastoreItem xmlns:ds="http://schemas.openxmlformats.org/officeDocument/2006/customXml" ds:itemID="{9BD9D02C-42A6-4353-AB4F-3876C40AF3CA}">
+  <ds:schemaRefs/>
+</ds:datastoreItem>
+</file>
+
+<file path=customXml/itemProps6.xml><?xml version="1.0" encoding="utf-8"?>
 <ds:datastoreItem xmlns:ds="http://schemas.openxmlformats.org/officeDocument/2006/customXml" ds:itemID="{CE4891E4-1261-45CA-BF53-BD180A76828E}">
   <ds:schemaRefs/>
 </ds:datastoreItem>
 </file>
 
-<file path=customXml/itemProps10.xml><?xml version="1.0" encoding="utf-8"?>
-<ds:datastoreItem xmlns:ds="http://schemas.openxmlformats.org/officeDocument/2006/customXml" ds:itemID="{B3EF2FD2-BCF0-47E9-B86F-B6B37A72A05C}">
+<file path=customXml/itemProps7.xml><?xml version="1.0" encoding="utf-8"?>
+<ds:datastoreItem xmlns:ds="http://schemas.openxmlformats.org/officeDocument/2006/customXml" ds:itemID="{92249970-8149-4EC4-A210-220C816741E5}">
   <ds:schemaRefs/>
 </ds:datastoreItem>
 </file>
 
-<file path=customXml/itemProps11.xml><?xml version="1.0" encoding="utf-8"?>
+<file path=customXml/itemProps8.xml><?xml version="1.0" encoding="utf-8"?>
 <ds:datastoreItem xmlns:ds="http://schemas.openxmlformats.org/officeDocument/2006/customXml" ds:itemID="{634E9CCB-F3BC-47D2-9E18-C41990E2EBE1}">
   <ds:schemaRefs/>
 </ds:datastoreItem>
 </file>
 
-<file path=customXml/itemProps12.xml><?xml version="1.0" encoding="utf-8"?>
-<ds:datastoreItem xmlns:ds="http://schemas.openxmlformats.org/officeDocument/2006/customXml" ds:itemID="{97EC287E-AA16-4BA5-8D02-531B775D2B37}">
-  <ds:schemaRefs/>
-</ds:datastoreItem>
-</file>
-
-<file path=customXml/itemProps13.xml><?xml version="1.0" encoding="utf-8"?>
-<ds:datastoreItem xmlns:ds="http://schemas.openxmlformats.org/officeDocument/2006/customXml" ds:itemID="{5F0E55E1-E112-49DF-82A6-308427439A24}">
-  <ds:schemaRefs/>
-</ds:datastoreItem>
-</file>
-
-<file path=customXml/itemProps14.xml><?xml version="1.0" encoding="utf-8"?>
-<ds:datastoreItem xmlns:ds="http://schemas.openxmlformats.org/officeDocument/2006/customXml" ds:itemID="{46E7D475-C485-48BC-BEE6-B943FFA37F8F}">
-  <ds:schemaRefs/>
-</ds:datastoreItem>
-</file>
-
-<file path=customXml/itemProps15.xml><?xml version="1.0" encoding="utf-8"?>
-<ds:datastoreItem xmlns:ds="http://schemas.openxmlformats.org/officeDocument/2006/customXml" ds:itemID="{4603A845-7477-4A6E-9426-1ECB74B20FBA}">
-  <ds:schemaRefs/>
-</ds:datastoreItem>
-</file>
-
-<file path=customXml/itemProps16.xml><?xml version="1.0" encoding="utf-8"?>
-<ds:datastoreItem xmlns:ds="http://schemas.openxmlformats.org/officeDocument/2006/customXml" ds:itemID="{420D13E1-600A-4552-9E88-5C5946DC9924}">
-  <ds:schemaRefs/>
-</ds:datastoreItem>
-</file>
-
-<file path=customXml/itemProps17.xml><?xml version="1.0" encoding="utf-8"?>
-<ds:datastoreItem xmlns:ds="http://schemas.openxmlformats.org/officeDocument/2006/customXml" ds:itemID="{BBEA1FFD-96EB-448C-872D-FD6D20257C06}">
-  <ds:schemaRefs/>
-</ds:datastoreItem>
-</file>
-
-<file path=customXml/itemProps18.xml><?xml version="1.0" encoding="utf-8"?>
-<ds:datastoreItem xmlns:ds="http://schemas.openxmlformats.org/officeDocument/2006/customXml" ds:itemID="{D1890F7F-DBEB-4506-B35E-064EE9ADD8AB}">
-  <ds:schemaRefs/>
-</ds:datastoreItem>
-</file>
-
-<file path=customXml/itemProps19.xml><?xml version="1.0" encoding="utf-8"?>
-<ds:datastoreItem xmlns:ds="http://schemas.openxmlformats.org/officeDocument/2006/customXml" ds:itemID="{37BB0D0B-996E-4EBD-95D2-A7CE96883882}">
-  <ds:schemaRefs/>
-</ds:datastoreItem>
-</file>
-
-<file path=customXml/itemProps2.xml><?xml version="1.0" encoding="utf-8"?>
-<ds:datastoreItem xmlns:ds="http://schemas.openxmlformats.org/officeDocument/2006/customXml" ds:itemID="{E15104B5-7E90-4369-A767-1A4487C44DA8}">
-  <ds:schemaRefs/>
-</ds:datastoreItem>
-</file>
-
-<file path=customXml/itemProps20.xml><?xml version="1.0" encoding="utf-8"?>
-<ds:datastoreItem xmlns:ds="http://schemas.openxmlformats.org/officeDocument/2006/customXml" ds:itemID="{9BD9D02C-42A6-4353-AB4F-3876C40AF3CA}">
-  <ds:schemaRefs/>
-</ds:datastoreItem>
-</file>
-
-<file path=customXml/itemProps21.xml><?xml version="1.0" encoding="utf-8"?>
-<ds:datastoreItem xmlns:ds="http://schemas.openxmlformats.org/officeDocument/2006/customXml" ds:itemID="{BE9F0B37-8E5E-44B3-A5A2-295809C64FD8}">
-  <ds:schemaRefs/>
-</ds:datastoreItem>
-</file>
-
-<file path=customXml/itemProps22.xml><?xml version="1.0" encoding="utf-8"?>
-<ds:datastoreItem xmlns:ds="http://schemas.openxmlformats.org/officeDocument/2006/customXml" ds:itemID="{066DBD01-7766-4ADE-86FC-51A662DEA336}">
-  <ds:schemaRefs/>
-</ds:datastoreItem>
-</file>
-
-<file path=customXml/itemProps3.xml><?xml version="1.0" encoding="utf-8"?>
-<ds:datastoreItem xmlns:ds="http://schemas.openxmlformats.org/officeDocument/2006/customXml" ds:itemID="{4E80FE49-B6D5-444C-8179-6BDF83DE13CB}">
-  <ds:schemaRefs/>
-</ds:datastoreItem>
-</file>
-
-<file path=customXml/itemProps4.xml><?xml version="1.0" encoding="utf-8"?>
-<ds:datastoreItem xmlns:ds="http://schemas.openxmlformats.org/officeDocument/2006/customXml" ds:itemID="{81BA2BB5-CE29-4933-8B31-07379275F8E4}">
-  <ds:schemaRefs/>
-</ds:datastoreItem>
-</file>
-
-<file path=customXml/itemProps5.xml><?xml version="1.0" encoding="utf-8"?>
+<file path=customXml/itemProps9.xml><?xml version="1.0" encoding="utf-8"?>
 <ds:datastoreItem xmlns:ds="http://schemas.openxmlformats.org/officeDocument/2006/customXml" ds:itemID="{71A54683-5EB6-4784-BB18-E70C4F50B3D9}">
   <ds:schemaRefs/>
 </ds:datastoreItem>
-</file>
-
-<file path=customXml/itemProps6.xml><?xml version="1.0" encoding="utf-8"?>
-<ds:datastoreItem xmlns:ds="http://schemas.openxmlformats.org/officeDocument/2006/customXml" ds:itemID="{92249970-8149-4EC4-A210-220C816741E5}">
-  <ds:schemaRefs/>
-</ds:datastoreItem>
-</file>
-
-<file path=customXml/itemProps7.xml><?xml version="1.0" encoding="utf-8"?>
-<ds:datastoreItem xmlns:ds="http://schemas.openxmlformats.org/officeDocument/2006/customXml" ds:itemID="{98EF18BE-1F2F-4C4F-B16C-B44A85FF5E64}">
-  <ds:schemaRefs/>
-</ds:datastoreItem>
-</file>
-
-<file path=customXml/itemProps8.xml><?xml version="1.0" encoding="utf-8"?>
-<ds:datastoreItem xmlns:ds="http://schemas.openxmlformats.org/officeDocument/2006/customXml" ds:itemID="{51676FE2-052D-44CF-A863-D00EA72E5A88}">
-  <ds:schemaRefs/>
-</ds:datastoreItem>
-</file>
-
-<file path=customXml/itemProps9.xml><?xml version="1.0" encoding="utf-8"?>
-<ds:datastoreItem xmlns:ds="http://schemas.openxmlformats.org/officeDocument/2006/customXml" ds:itemID="{1907735A-BAEB-4414-9DA2-54CF6BF835E6}">
-  <ds:schemaRefs/>
-</ds:datastoreItem>
 </file>
</xml_diff>